<commit_message>
plotting effect of difficulty probability on planned defections
</commit_message>
<xml_diff>
--- a/results and plots/Planned _defections.pptx
+++ b/results and plots/Planned _defections.pptx
@@ -10,6 +10,7 @@
     <p:sldId id="257" r:id="rId4"/>
     <p:sldId id="259" r:id="rId5"/>
     <p:sldId id="260" r:id="rId6"/>
+    <p:sldId id="261" r:id="rId7"/>
   </p:sldIdLst>
   <p:sldSz cx="12192000" cy="6858000"/>
   <p:notesSz cx="6858000" cy="9144000"/>
@@ -108,6 +109,11 @@
       </a:defRPr>
     </a:lvl9pPr>
   </p:defaultTextStyle>
+  <p:extLst>
+    <p:ext uri="{EFAFB233-063F-42B5-8137-9DF3F51BA10A}">
+      <p15:sldGuideLst xmlns:p15="http://schemas.microsoft.com/office/powerpoint/2012/main"/>
+    </p:ext>
+  </p:extLst>
 </p:presentation>
 </file>
 
@@ -260,7 +266,7 @@
           <a:p>
             <a:fld id="{FDD6A694-968D-4320-BD99-88FE3DDEFF52}" type="datetimeFigureOut">
               <a:rPr lang="en-DE" smtClean="0"/>
-              <a:t>13/07/2023</a:t>
+              <a:t>07/14/2023</a:t>
             </a:fld>
             <a:endParaRPr lang="en-DE"/>
           </a:p>
@@ -460,7 +466,7 @@
           <a:p>
             <a:fld id="{FDD6A694-968D-4320-BD99-88FE3DDEFF52}" type="datetimeFigureOut">
               <a:rPr lang="en-DE" smtClean="0"/>
-              <a:t>13/07/2023</a:t>
+              <a:t>07/14/2023</a:t>
             </a:fld>
             <a:endParaRPr lang="en-DE"/>
           </a:p>
@@ -670,7 +676,7 @@
           <a:p>
             <a:fld id="{FDD6A694-968D-4320-BD99-88FE3DDEFF52}" type="datetimeFigureOut">
               <a:rPr lang="en-DE" smtClean="0"/>
-              <a:t>13/07/2023</a:t>
+              <a:t>07/14/2023</a:t>
             </a:fld>
             <a:endParaRPr lang="en-DE"/>
           </a:p>
@@ -870,7 +876,7 @@
           <a:p>
             <a:fld id="{FDD6A694-968D-4320-BD99-88FE3DDEFF52}" type="datetimeFigureOut">
               <a:rPr lang="en-DE" smtClean="0"/>
-              <a:t>13/07/2023</a:t>
+              <a:t>07/14/2023</a:t>
             </a:fld>
             <a:endParaRPr lang="en-DE"/>
           </a:p>
@@ -1146,7 +1152,7 @@
           <a:p>
             <a:fld id="{FDD6A694-968D-4320-BD99-88FE3DDEFF52}" type="datetimeFigureOut">
               <a:rPr lang="en-DE" smtClean="0"/>
-              <a:t>13/07/2023</a:t>
+              <a:t>07/14/2023</a:t>
             </a:fld>
             <a:endParaRPr lang="en-DE"/>
           </a:p>
@@ -1414,7 +1420,7 @@
           <a:p>
             <a:fld id="{FDD6A694-968D-4320-BD99-88FE3DDEFF52}" type="datetimeFigureOut">
               <a:rPr lang="en-DE" smtClean="0"/>
-              <a:t>13/07/2023</a:t>
+              <a:t>07/14/2023</a:t>
             </a:fld>
             <a:endParaRPr lang="en-DE"/>
           </a:p>
@@ -1829,7 +1835,7 @@
           <a:p>
             <a:fld id="{FDD6A694-968D-4320-BD99-88FE3DDEFF52}" type="datetimeFigureOut">
               <a:rPr lang="en-DE" smtClean="0"/>
-              <a:t>13/07/2023</a:t>
+              <a:t>07/14/2023</a:t>
             </a:fld>
             <a:endParaRPr lang="en-DE"/>
           </a:p>
@@ -1971,7 +1977,7 @@
           <a:p>
             <a:fld id="{FDD6A694-968D-4320-BD99-88FE3DDEFF52}" type="datetimeFigureOut">
               <a:rPr lang="en-DE" smtClean="0"/>
-              <a:t>13/07/2023</a:t>
+              <a:t>07/14/2023</a:t>
             </a:fld>
             <a:endParaRPr lang="en-DE"/>
           </a:p>
@@ -2084,7 +2090,7 @@
           <a:p>
             <a:fld id="{FDD6A694-968D-4320-BD99-88FE3DDEFF52}" type="datetimeFigureOut">
               <a:rPr lang="en-DE" smtClean="0"/>
-              <a:t>13/07/2023</a:t>
+              <a:t>07/14/2023</a:t>
             </a:fld>
             <a:endParaRPr lang="en-DE"/>
           </a:p>
@@ -2397,7 +2403,7 @@
           <a:p>
             <a:fld id="{FDD6A694-968D-4320-BD99-88FE3DDEFF52}" type="datetimeFigureOut">
               <a:rPr lang="en-DE" smtClean="0"/>
-              <a:t>13/07/2023</a:t>
+              <a:t>07/14/2023</a:t>
             </a:fld>
             <a:endParaRPr lang="en-DE"/>
           </a:p>
@@ -2686,7 +2692,7 @@
           <a:p>
             <a:fld id="{FDD6A694-968D-4320-BD99-88FE3DDEFF52}" type="datetimeFigureOut">
               <a:rPr lang="en-DE" smtClean="0"/>
-              <a:t>13/07/2023</a:t>
+              <a:t>07/14/2023</a:t>
             </a:fld>
             <a:endParaRPr lang="en-DE"/>
           </a:p>
@@ -2929,7 +2935,7 @@
           <a:p>
             <a:fld id="{FDD6A694-968D-4320-BD99-88FE3DDEFF52}" type="datetimeFigureOut">
               <a:rPr lang="en-DE" smtClean="0"/>
-              <a:t>13/07/2023</a:t>
+              <a:t>07/14/2023</a:t>
             </a:fld>
             <a:endParaRPr lang="en-DE"/>
           </a:p>
@@ -3802,7 +3808,7 @@
           <a:p>
             <a:r>
               <a:rPr lang="en-US" dirty="0"/>
-              <a:t>With discounting, in this param regime, checking on timestep = 6 and an unlikely transition to the difficult state means delaying working further until step = 9. So continuing working is delayed further due to unlikely hardness. </a:t>
+              <a:t>With discounting, in this param regime, checking on timestep = 6 and an unlikely transition to the difficult state means delaying working further until step = 9. So continuing working is delayed further due to unlikely toughness. </a:t>
             </a:r>
             <a:endParaRPr lang="en-DE" dirty="0"/>
           </a:p>
@@ -3993,8 +3999,8 @@
         </p:nvSpPr>
         <p:spPr>
           <a:xfrm>
-            <a:off x="1011194" y="1253331"/>
-            <a:ext cx="10515600" cy="4351338"/>
+            <a:off x="683394" y="500514"/>
+            <a:ext cx="10712918" cy="5967663"/>
           </a:xfrm>
         </p:spPr>
         <p:txBody>
@@ -4004,6 +4010,172 @@
             <a:pPr marL="0" indent="0">
               <a:buNone/>
             </a:pPr>
+            <a:r>
+              <a:rPr lang="en-IN" dirty="0"/>
+              <a:t>How do delays in checking depend on the probability of task being easy/ hard? More likely that the task is hard, better to check into task later. When difference between hard and easy states reduces due to high efficacy or low difference in efforts to work, this effect disappears.</a:t>
+            </a:r>
+            <a:endParaRPr lang="en-DE" dirty="0"/>
+          </a:p>
+        </p:txBody>
+      </p:sp>
+      <p:pic>
+        <p:nvPicPr>
+          <p:cNvPr id="4" name="Picture 3">
+            <a:extLst>
+              <a:ext uri="{FF2B5EF4-FFF2-40B4-BE49-F238E27FC236}">
+                <a16:creationId xmlns:a16="http://schemas.microsoft.com/office/drawing/2014/main" id="{3F73810C-3A2F-631C-ED91-79EBE0691091}"/>
+              </a:ext>
+            </a:extLst>
+          </p:cNvPr>
+          <p:cNvPicPr>
+            <a:picLocks noChangeAspect="1"/>
+          </p:cNvPicPr>
+          <p:nvPr/>
+        </p:nvPicPr>
+        <p:blipFill>
+          <a:blip r:embed="rId2"/>
+          <a:stretch>
+            <a:fillRect/>
+          </a:stretch>
+        </p:blipFill>
+        <p:spPr>
+          <a:xfrm>
+            <a:off x="308009" y="2674822"/>
+            <a:ext cx="3640227" cy="2844154"/>
+          </a:xfrm>
+          <a:prstGeom prst="rect">
+            <a:avLst/>
+          </a:prstGeom>
+        </p:spPr>
+      </p:pic>
+      <p:pic>
+        <p:nvPicPr>
+          <p:cNvPr id="8" name="Picture 7">
+            <a:extLst>
+              <a:ext uri="{FF2B5EF4-FFF2-40B4-BE49-F238E27FC236}">
+                <a16:creationId xmlns:a16="http://schemas.microsoft.com/office/drawing/2014/main" id="{775068ED-B877-0CB1-0469-29F45EEAD31A}"/>
+              </a:ext>
+            </a:extLst>
+          </p:cNvPr>
+          <p:cNvPicPr>
+            <a:picLocks noChangeAspect="1"/>
+          </p:cNvPicPr>
+          <p:nvPr/>
+        </p:nvPicPr>
+        <p:blipFill>
+          <a:blip r:embed="rId3"/>
+          <a:stretch>
+            <a:fillRect/>
+          </a:stretch>
+        </p:blipFill>
+        <p:spPr>
+          <a:xfrm>
+            <a:off x="4323621" y="3513333"/>
+            <a:ext cx="3640227" cy="2844153"/>
+          </a:xfrm>
+          <a:prstGeom prst="rect">
+            <a:avLst/>
+          </a:prstGeom>
+        </p:spPr>
+      </p:pic>
+      <p:pic>
+        <p:nvPicPr>
+          <p:cNvPr id="10" name="Picture 9">
+            <a:extLst>
+              <a:ext uri="{FF2B5EF4-FFF2-40B4-BE49-F238E27FC236}">
+                <a16:creationId xmlns:a16="http://schemas.microsoft.com/office/drawing/2014/main" id="{B61BBF1B-BE41-E951-DE0A-D93572E0BCC6}"/>
+              </a:ext>
+            </a:extLst>
+          </p:cNvPr>
+          <p:cNvPicPr>
+            <a:picLocks noChangeAspect="1"/>
+          </p:cNvPicPr>
+          <p:nvPr/>
+        </p:nvPicPr>
+        <p:blipFill>
+          <a:blip r:embed="rId4"/>
+          <a:stretch>
+            <a:fillRect/>
+          </a:stretch>
+        </p:blipFill>
+        <p:spPr>
+          <a:xfrm>
+            <a:off x="8131470" y="2674823"/>
+            <a:ext cx="3640227" cy="2844153"/>
+          </a:xfrm>
+          <a:prstGeom prst="rect">
+            <a:avLst/>
+          </a:prstGeom>
+        </p:spPr>
+      </p:pic>
+      <p:sp>
+        <p:nvSpPr>
+          <p:cNvPr id="11" name="TextBox 10">
+            <a:extLst>
+              <a:ext uri="{FF2B5EF4-FFF2-40B4-BE49-F238E27FC236}">
+                <a16:creationId xmlns:a16="http://schemas.microsoft.com/office/drawing/2014/main" id="{0487ADFF-9A07-68F1-3B4E-724370A7B467}"/>
+              </a:ext>
+            </a:extLst>
+          </p:cNvPr>
+          <p:cNvSpPr txBox="1"/>
+          <p:nvPr/>
+        </p:nvSpPr>
+        <p:spPr>
+          <a:xfrm>
+            <a:off x="8889751" y="2305490"/>
+            <a:ext cx="2881946" cy="369332"/>
+          </a:xfrm>
+          <a:prstGeom prst="rect">
+            <a:avLst/>
+          </a:prstGeom>
+          <a:noFill/>
+        </p:spPr>
+        <p:txBody>
+          <a:bodyPr wrap="square" rtlCol="0">
+            <a:spAutoFit/>
+          </a:bodyPr>
+          <a:lstStyle/>
+          <a:p>
+            <a:r>
+              <a:rPr lang="en-US" dirty="0"/>
+              <a:t>Effort(easy, hard) = -0.1, -0.5</a:t>
+            </a:r>
+            <a:endParaRPr lang="en-DE" dirty="0"/>
+          </a:p>
+        </p:txBody>
+      </p:sp>
+      <p:sp>
+        <p:nvSpPr>
+          <p:cNvPr id="12" name="TextBox 11">
+            <a:extLst>
+              <a:ext uri="{FF2B5EF4-FFF2-40B4-BE49-F238E27FC236}">
+                <a16:creationId xmlns:a16="http://schemas.microsoft.com/office/drawing/2014/main" id="{5B650873-12F3-3A00-528C-9A91BF5FE755}"/>
+              </a:ext>
+            </a:extLst>
+          </p:cNvPr>
+          <p:cNvSpPr txBox="1"/>
+          <p:nvPr/>
+        </p:nvSpPr>
+        <p:spPr>
+          <a:xfrm>
+            <a:off x="966556" y="2360454"/>
+            <a:ext cx="2881946" cy="369332"/>
+          </a:xfrm>
+          <a:prstGeom prst="rect">
+            <a:avLst/>
+          </a:prstGeom>
+          <a:noFill/>
+        </p:spPr>
+        <p:txBody>
+          <a:bodyPr wrap="square" rtlCol="0">
+            <a:spAutoFit/>
+          </a:bodyPr>
+          <a:lstStyle/>
+          <a:p>
+            <a:r>
+              <a:rPr lang="en-US" dirty="0"/>
+              <a:t>Effort(easy, hard) = -0.1, -1.0</a:t>
+            </a:r>
             <a:endParaRPr lang="en-DE" dirty="0"/>
           </a:p>
         </p:txBody>
@@ -4012,6 +4184,126 @@
     <p:extLst>
       <p:ext uri="{BB962C8B-B14F-4D97-AF65-F5344CB8AC3E}">
         <p14:creationId xmlns:p14="http://schemas.microsoft.com/office/powerpoint/2010/main" val="3898448519"/>
+      </p:ext>
+    </p:extLst>
+  </p:cSld>
+  <p:clrMapOvr>
+    <a:masterClrMapping/>
+  </p:clrMapOvr>
+</p:sld>
+</file>
+
+<file path=ppt/slides/slide6.xml><?xml version="1.0" encoding="utf-8"?>
+<p:sld xmlns:a="http://schemas.openxmlformats.org/drawingml/2006/main" xmlns:r="http://schemas.openxmlformats.org/officeDocument/2006/relationships" xmlns:p="http://schemas.openxmlformats.org/presentationml/2006/main">
+  <p:cSld>
+    <p:spTree>
+      <p:nvGrpSpPr>
+        <p:cNvPr id="1" name=""/>
+        <p:cNvGrpSpPr/>
+        <p:nvPr/>
+      </p:nvGrpSpPr>
+      <p:grpSpPr>
+        <a:xfrm>
+          <a:off x="0" y="0"/>
+          <a:ext cx="0" cy="0"/>
+          <a:chOff x="0" y="0"/>
+          <a:chExt cx="0" cy="0"/>
+        </a:xfrm>
+      </p:grpSpPr>
+      <p:sp>
+        <p:nvSpPr>
+          <p:cNvPr id="2" name="Title 1">
+            <a:extLst>
+              <a:ext uri="{FF2B5EF4-FFF2-40B4-BE49-F238E27FC236}">
+                <a16:creationId xmlns:a16="http://schemas.microsoft.com/office/drawing/2014/main" id="{A12235F9-3C90-1443-8723-E57455F91C3B}"/>
+              </a:ext>
+            </a:extLst>
+          </p:cNvPr>
+          <p:cNvSpPr>
+            <a:spLocks noGrp="1"/>
+          </p:cNvSpPr>
+          <p:nvPr>
+            <p:ph type="title"/>
+          </p:nvPr>
+        </p:nvSpPr>
+        <p:spPr/>
+        <p:txBody>
+          <a:bodyPr/>
+          <a:lstStyle/>
+          <a:p>
+            <a:endParaRPr lang="en-IN"/>
+          </a:p>
+        </p:txBody>
+      </p:sp>
+      <p:sp>
+        <p:nvSpPr>
+          <p:cNvPr id="3" name="Content Placeholder 2">
+            <a:extLst>
+              <a:ext uri="{FF2B5EF4-FFF2-40B4-BE49-F238E27FC236}">
+                <a16:creationId xmlns:a16="http://schemas.microsoft.com/office/drawing/2014/main" id="{8927A9AD-D261-A4A5-EEE8-56891E4C5413}"/>
+              </a:ext>
+            </a:extLst>
+          </p:cNvPr>
+          <p:cNvSpPr>
+            <a:spLocks noGrp="1"/>
+          </p:cNvSpPr>
+          <p:nvPr>
+            <p:ph idx="1"/>
+          </p:nvPr>
+        </p:nvSpPr>
+        <p:spPr/>
+        <p:txBody>
+          <a:bodyPr/>
+          <a:lstStyle/>
+          <a:p>
+            <a:r>
+              <a:rPr lang="en-US" dirty="0"/>
+              <a:t>In sum, efficacy, reward structure </a:t>
+            </a:r>
+            <a:r>
+              <a:rPr lang="en-US" dirty="0" err="1"/>
+              <a:t>etc</a:t>
+            </a:r>
+            <a:r>
+              <a:rPr lang="en-US" dirty="0"/>
+              <a:t> determine when to start working in the two work states independent of what happens in the starting state as there is no transition back. When to check is determined by all these factors AND the probabilities of task being easy or hard</a:t>
+            </a:r>
+            <a:br>
+              <a:rPr lang="en-US" dirty="0"/>
+            </a:br>
+            <a:endParaRPr lang="en-US" dirty="0"/>
+          </a:p>
+          <a:p>
+            <a:r>
+              <a:rPr lang="en-US" dirty="0"/>
+              <a:t>In the case that the task is tough </a:t>
+            </a:r>
+            <a:r>
+              <a:rPr lang="en-US" dirty="0" err="1"/>
+              <a:t>unlikelily</a:t>
+            </a:r>
+            <a:r>
+              <a:rPr lang="en-US" dirty="0"/>
+              <a:t>, there is a planned ‘defection’ further into </a:t>
+            </a:r>
+            <a:r>
+              <a:rPr lang="en-US"/>
+              <a:t>the future</a:t>
+            </a:r>
+            <a:endParaRPr lang="en-US" dirty="0"/>
+          </a:p>
+          <a:p>
+            <a:pPr marL="0" indent="0">
+              <a:buNone/>
+            </a:pPr>
+            <a:endParaRPr lang="en-IN" dirty="0"/>
+          </a:p>
+        </p:txBody>
+      </p:sp>
+    </p:spTree>
+    <p:extLst>
+      <p:ext uri="{BB962C8B-B14F-4D97-AF65-F5344CB8AC3E}">
+        <p14:creationId xmlns:p14="http://schemas.microsoft.com/office/powerpoint/2010/main" val="2892682019"/>
       </p:ext>
     </p:extLst>
   </p:cSld>

</xml_diff>

<commit_message>
exploring case with evolving effort states
</commit_message>
<xml_diff>
--- a/results and plots/Planned _defections.pptx
+++ b/results and plots/Planned _defections.pptx
@@ -266,7 +266,7 @@
           <a:p>
             <a:fld id="{FDD6A694-968D-4320-BD99-88FE3DDEFF52}" type="datetimeFigureOut">
               <a:rPr lang="en-DE" smtClean="0"/>
-              <a:t>07/14/2023</a:t>
+              <a:t>19/07/2023</a:t>
             </a:fld>
             <a:endParaRPr lang="en-DE"/>
           </a:p>
@@ -466,7 +466,7 @@
           <a:p>
             <a:fld id="{FDD6A694-968D-4320-BD99-88FE3DDEFF52}" type="datetimeFigureOut">
               <a:rPr lang="en-DE" smtClean="0"/>
-              <a:t>07/14/2023</a:t>
+              <a:t>19/07/2023</a:t>
             </a:fld>
             <a:endParaRPr lang="en-DE"/>
           </a:p>
@@ -676,7 +676,7 @@
           <a:p>
             <a:fld id="{FDD6A694-968D-4320-BD99-88FE3DDEFF52}" type="datetimeFigureOut">
               <a:rPr lang="en-DE" smtClean="0"/>
-              <a:t>07/14/2023</a:t>
+              <a:t>19/07/2023</a:t>
             </a:fld>
             <a:endParaRPr lang="en-DE"/>
           </a:p>
@@ -876,7 +876,7 @@
           <a:p>
             <a:fld id="{FDD6A694-968D-4320-BD99-88FE3DDEFF52}" type="datetimeFigureOut">
               <a:rPr lang="en-DE" smtClean="0"/>
-              <a:t>07/14/2023</a:t>
+              <a:t>19/07/2023</a:t>
             </a:fld>
             <a:endParaRPr lang="en-DE"/>
           </a:p>
@@ -1152,7 +1152,7 @@
           <a:p>
             <a:fld id="{FDD6A694-968D-4320-BD99-88FE3DDEFF52}" type="datetimeFigureOut">
               <a:rPr lang="en-DE" smtClean="0"/>
-              <a:t>07/14/2023</a:t>
+              <a:t>19/07/2023</a:t>
             </a:fld>
             <a:endParaRPr lang="en-DE"/>
           </a:p>
@@ -1420,7 +1420,7 @@
           <a:p>
             <a:fld id="{FDD6A694-968D-4320-BD99-88FE3DDEFF52}" type="datetimeFigureOut">
               <a:rPr lang="en-DE" smtClean="0"/>
-              <a:t>07/14/2023</a:t>
+              <a:t>19/07/2023</a:t>
             </a:fld>
             <a:endParaRPr lang="en-DE"/>
           </a:p>
@@ -1835,7 +1835,7 @@
           <a:p>
             <a:fld id="{FDD6A694-968D-4320-BD99-88FE3DDEFF52}" type="datetimeFigureOut">
               <a:rPr lang="en-DE" smtClean="0"/>
-              <a:t>07/14/2023</a:t>
+              <a:t>19/07/2023</a:t>
             </a:fld>
             <a:endParaRPr lang="en-DE"/>
           </a:p>
@@ -1977,7 +1977,7 @@
           <a:p>
             <a:fld id="{FDD6A694-968D-4320-BD99-88FE3DDEFF52}" type="datetimeFigureOut">
               <a:rPr lang="en-DE" smtClean="0"/>
-              <a:t>07/14/2023</a:t>
+              <a:t>19/07/2023</a:t>
             </a:fld>
             <a:endParaRPr lang="en-DE"/>
           </a:p>
@@ -2090,7 +2090,7 @@
           <a:p>
             <a:fld id="{FDD6A694-968D-4320-BD99-88FE3DDEFF52}" type="datetimeFigureOut">
               <a:rPr lang="en-DE" smtClean="0"/>
-              <a:t>07/14/2023</a:t>
+              <a:t>19/07/2023</a:t>
             </a:fld>
             <a:endParaRPr lang="en-DE"/>
           </a:p>
@@ -2403,7 +2403,7 @@
           <a:p>
             <a:fld id="{FDD6A694-968D-4320-BD99-88FE3DDEFF52}" type="datetimeFigureOut">
               <a:rPr lang="en-DE" smtClean="0"/>
-              <a:t>07/14/2023</a:t>
+              <a:t>19/07/2023</a:t>
             </a:fld>
             <a:endParaRPr lang="en-DE"/>
           </a:p>
@@ -2692,7 +2692,7 @@
           <a:p>
             <a:fld id="{FDD6A694-968D-4320-BD99-88FE3DDEFF52}" type="datetimeFigureOut">
               <a:rPr lang="en-DE" smtClean="0"/>
-              <a:t>07/14/2023</a:t>
+              <a:t>19/07/2023</a:t>
             </a:fld>
             <a:endParaRPr lang="en-DE"/>
           </a:p>
@@ -2935,7 +2935,7 @@
           <a:p>
             <a:fld id="{FDD6A694-968D-4320-BD99-88FE3DDEFF52}" type="datetimeFigureOut">
               <a:rPr lang="en-DE" smtClean="0"/>
-              <a:t>07/14/2023</a:t>
+              <a:t>19/07/2023</a:t>
             </a:fld>
             <a:endParaRPr lang="en-DE"/>
           </a:p>

</xml_diff>